<commit_message>
Generate_CMD is a good template for SGE
</commit_message>
<xml_diff>
--- a/Progress_report/Catallin/week4_cancer_fraction.pptx
+++ b/Progress_report/Catallin/week4_cancer_fraction.pptx
@@ -5,7 +5,7 @@
     <p:sldMasterId id="2147483648" r:id="rId1"/>
   </p:sldMasterIdLst>
   <p:notesMasterIdLst>
-    <p:notesMasterId r:id="rId15"/>
+    <p:notesMasterId r:id="rId16"/>
   </p:notesMasterIdLst>
   <p:sldIdLst>
     <p:sldId id="257" r:id="rId2"/>
@@ -21,6 +21,7 @@
     <p:sldId id="271" r:id="rId12"/>
     <p:sldId id="273" r:id="rId13"/>
     <p:sldId id="275" r:id="rId14"/>
+    <p:sldId id="276" r:id="rId15"/>
   </p:sldIdLst>
   <p:sldSz cx="12192000" cy="6858000"/>
   <p:notesSz cx="6858000" cy="9144000"/>
@@ -143,6 +144,11 @@
             <p14:sldId id="275"/>
           </p14:sldIdLst>
         </p14:section>
+        <p14:section name="Testing" id="{F37F1FD2-E7BA-0042-AF91-92DE421A552E}">
+          <p14:sldIdLst>
+            <p14:sldId id="276"/>
+          </p14:sldIdLst>
+        </p14:section>
       </p14:sectionLst>
     </p:ext>
     <p:ext uri="{EFAFB233-063F-42B5-8137-9DF3F51BA10A}">
@@ -234,7 +240,7 @@
           <a:p>
             <a:fld id="{FAF376F0-0C71-644E-B4E6-54FE08EBADD8}" type="datetimeFigureOut">
               <a:rPr lang="en-US" smtClean="0"/>
-              <a:t>7/6/21</a:t>
+              <a:t>7/8/21</a:t>
             </a:fld>
             <a:endParaRPr lang="en-US"/>
           </a:p>
@@ -1553,7 +1559,7 @@
           <a:p>
             <a:fld id="{D73660E5-8513-AA47-A17B-37D2C392AEFF}" type="datetimeFigureOut">
               <a:rPr lang="en-US" smtClean="0"/>
-              <a:t>7/6/21</a:t>
+              <a:t>7/8/21</a:t>
             </a:fld>
             <a:endParaRPr lang="en-US"/>
           </a:p>
@@ -1751,7 +1757,7 @@
           <a:p>
             <a:fld id="{D73660E5-8513-AA47-A17B-37D2C392AEFF}" type="datetimeFigureOut">
               <a:rPr lang="en-US" smtClean="0"/>
-              <a:t>7/6/21</a:t>
+              <a:t>7/8/21</a:t>
             </a:fld>
             <a:endParaRPr lang="en-US"/>
           </a:p>
@@ -1959,7 +1965,7 @@
           <a:p>
             <a:fld id="{D73660E5-8513-AA47-A17B-37D2C392AEFF}" type="datetimeFigureOut">
               <a:rPr lang="en-US" smtClean="0"/>
-              <a:t>7/6/21</a:t>
+              <a:t>7/8/21</a:t>
             </a:fld>
             <a:endParaRPr lang="en-US"/>
           </a:p>
@@ -2788,7 +2794,7 @@
           <a:p>
             <a:fld id="{D73660E5-8513-AA47-A17B-37D2C392AEFF}" type="datetimeFigureOut">
               <a:rPr lang="en-US" smtClean="0"/>
-              <a:t>7/6/21</a:t>
+              <a:t>7/8/21</a:t>
             </a:fld>
             <a:endParaRPr lang="en-US"/>
           </a:p>
@@ -3063,7 +3069,7 @@
           <a:p>
             <a:fld id="{D73660E5-8513-AA47-A17B-37D2C392AEFF}" type="datetimeFigureOut">
               <a:rPr lang="en-US" smtClean="0"/>
-              <a:t>7/6/21</a:t>
+              <a:t>7/8/21</a:t>
             </a:fld>
             <a:endParaRPr lang="en-US"/>
           </a:p>
@@ -3328,7 +3334,7 @@
           <a:p>
             <a:fld id="{D73660E5-8513-AA47-A17B-37D2C392AEFF}" type="datetimeFigureOut">
               <a:rPr lang="en-US" smtClean="0"/>
-              <a:t>7/6/21</a:t>
+              <a:t>7/8/21</a:t>
             </a:fld>
             <a:endParaRPr lang="en-US"/>
           </a:p>
@@ -3740,7 +3746,7 @@
           <a:p>
             <a:fld id="{D73660E5-8513-AA47-A17B-37D2C392AEFF}" type="datetimeFigureOut">
               <a:rPr lang="en-US" smtClean="0"/>
-              <a:t>7/6/21</a:t>
+              <a:t>7/8/21</a:t>
             </a:fld>
             <a:endParaRPr lang="en-US"/>
           </a:p>
@@ -3881,7 +3887,7 @@
           <a:p>
             <a:fld id="{D73660E5-8513-AA47-A17B-37D2C392AEFF}" type="datetimeFigureOut">
               <a:rPr lang="en-US" smtClean="0"/>
-              <a:t>7/6/21</a:t>
+              <a:t>7/8/21</a:t>
             </a:fld>
             <a:endParaRPr lang="en-US"/>
           </a:p>
@@ -3994,7 +4000,7 @@
           <a:p>
             <a:fld id="{D73660E5-8513-AA47-A17B-37D2C392AEFF}" type="datetimeFigureOut">
               <a:rPr lang="en-US" smtClean="0"/>
-              <a:t>7/6/21</a:t>
+              <a:t>7/8/21</a:t>
             </a:fld>
             <a:endParaRPr lang="en-US"/>
           </a:p>
@@ -4305,7 +4311,7 @@
           <a:p>
             <a:fld id="{D73660E5-8513-AA47-A17B-37D2C392AEFF}" type="datetimeFigureOut">
               <a:rPr lang="en-US" smtClean="0"/>
-              <a:t>7/6/21</a:t>
+              <a:t>7/8/21</a:t>
             </a:fld>
             <a:endParaRPr lang="en-US"/>
           </a:p>
@@ -4593,7 +4599,7 @@
           <a:p>
             <a:fld id="{D73660E5-8513-AA47-A17B-37D2C392AEFF}" type="datetimeFigureOut">
               <a:rPr lang="en-US" smtClean="0"/>
-              <a:t>7/6/21</a:t>
+              <a:t>7/8/21</a:t>
             </a:fld>
             <a:endParaRPr lang="en-US"/>
           </a:p>
@@ -4834,7 +4840,7 @@
           <a:p>
             <a:fld id="{D73660E5-8513-AA47-A17B-37D2C392AEFF}" type="datetimeFigureOut">
               <a:rPr lang="en-US" smtClean="0"/>
-              <a:t>7/6/21</a:t>
+              <a:t>7/8/21</a:t>
             </a:fld>
             <a:endParaRPr lang="en-US"/>
           </a:p>
@@ -6054,6 +6060,105 @@
     <p:extLst>
       <p:ext uri="{BB962C8B-B14F-4D97-AF65-F5344CB8AC3E}">
         <p14:creationId xmlns:p14="http://schemas.microsoft.com/office/powerpoint/2010/main" val="744318984"/>
+      </p:ext>
+    </p:extLst>
+  </p:cSld>
+  <p:clrMapOvr>
+    <a:masterClrMapping/>
+  </p:clrMapOvr>
+</p:sld>
+</file>
+
+<file path=ppt/slides/slide14.xml><?xml version="1.0" encoding="utf-8"?>
+<p:sld xmlns:a="http://schemas.openxmlformats.org/drawingml/2006/main" xmlns:r="http://schemas.openxmlformats.org/officeDocument/2006/relationships" xmlns:p="http://schemas.openxmlformats.org/presentationml/2006/main">
+  <p:cSld>
+    <p:spTree>
+      <p:nvGrpSpPr>
+        <p:cNvPr id="1" name=""/>
+        <p:cNvGrpSpPr/>
+        <p:nvPr/>
+      </p:nvGrpSpPr>
+      <p:grpSpPr>
+        <a:xfrm>
+          <a:off x="0" y="0"/>
+          <a:ext cx="0" cy="0"/>
+          <a:chOff x="0" y="0"/>
+          <a:chExt cx="0" cy="0"/>
+        </a:xfrm>
+      </p:grpSpPr>
+      <p:sp>
+        <p:nvSpPr>
+          <p:cNvPr id="2" name="Title 1">
+            <a:extLst>
+              <a:ext uri="{FF2B5EF4-FFF2-40B4-BE49-F238E27FC236}">
+                <a16:creationId xmlns:a16="http://schemas.microsoft.com/office/drawing/2014/main" id="{9AD37433-9442-924C-8903-7C35AD5ED0CB}"/>
+              </a:ext>
+            </a:extLst>
+          </p:cNvPr>
+          <p:cNvSpPr>
+            <a:spLocks noGrp="1"/>
+          </p:cNvSpPr>
+          <p:nvPr>
+            <p:ph type="title"/>
+          </p:nvPr>
+        </p:nvSpPr>
+        <p:spPr/>
+        <p:txBody>
+          <a:bodyPr/>
+          <a:lstStyle/>
+          <a:p>
+            <a:endParaRPr lang="en-US"/>
+          </a:p>
+        </p:txBody>
+      </p:sp>
+      <p:sp>
+        <p:nvSpPr>
+          <p:cNvPr id="3" name="Content Placeholder 2">
+            <a:extLst>
+              <a:ext uri="{FF2B5EF4-FFF2-40B4-BE49-F238E27FC236}">
+                <a16:creationId xmlns:a16="http://schemas.microsoft.com/office/drawing/2014/main" id="{CFF2E10E-3341-DB44-A26C-7FEC466E2715}"/>
+              </a:ext>
+            </a:extLst>
+          </p:cNvPr>
+          <p:cNvSpPr>
+            <a:spLocks noGrp="1"/>
+          </p:cNvSpPr>
+          <p:nvPr>
+            <p:ph idx="1"/>
+          </p:nvPr>
+        </p:nvSpPr>
+        <p:spPr/>
+        <p:txBody>
+          <a:bodyPr/>
+          <a:lstStyle/>
+          <a:p>
+            <a:r>
+              <a:rPr lang="en-US" dirty="0"/>
+              <a:t>/</a:t>
+            </a:r>
+            <a:r>
+              <a:rPr lang="en-US" dirty="0" err="1"/>
+              <a:t>ghds</a:t>
+            </a:r>
+            <a:r>
+              <a:rPr lang="en-US" dirty="0"/>
+              <a:t>/groups/bioinformatics/02_DEVELOPMENT/200830_GHCNVWG_PIPELINE/results/210608_CLINICAL_SAMPLES_V0.5/</a:t>
+            </a:r>
+            <a:r>
+              <a:rPr lang="en-US" dirty="0" err="1"/>
+              <a:t>processed_samples</a:t>
+            </a:r>
+            <a:r>
+              <a:rPr lang="en-US"/>
+              <a:t>/List_of_samples_4TF_testing.210708.tsv</a:t>
+            </a:r>
+          </a:p>
+        </p:txBody>
+      </p:sp>
+    </p:spTree>
+    <p:extLst>
+      <p:ext uri="{BB962C8B-B14F-4D97-AF65-F5344CB8AC3E}">
+        <p14:creationId xmlns:p14="http://schemas.microsoft.com/office/powerpoint/2010/main" val="3014309696"/>
       </p:ext>
     </p:extLst>
   </p:cSld>

</xml_diff>